<commit_message>
Added Animation to ppt
</commit_message>
<xml_diff>
--- a/Non-Technical Summary.pptx
+++ b/Non-Technical Summary.pptx
@@ -5193,6 +5193,518 @@
   <p:clrMapOvr>
     <a:masterClrMapping/>
   </p:clrMapOvr>
+  <p:timing>
+    <p:tnLst>
+      <p:par>
+        <p:cTn id="1" dur="indefinite" restart="never" nodeType="tmRoot">
+          <p:childTnLst>
+            <p:seq concurrent="1" nextAc="seek">
+              <p:cTn id="2" dur="indefinite" nodeType="mainSeq">
+                <p:childTnLst>
+                  <p:par>
+                    <p:cTn id="3" fill="hold">
+                      <p:stCondLst>
+                        <p:cond delay="indefinite"/>
+                      </p:stCondLst>
+                      <p:childTnLst>
+                        <p:par>
+                          <p:cTn id="4" fill="hold">
+                            <p:stCondLst>
+                              <p:cond delay="0"/>
+                            </p:stCondLst>
+                            <p:childTnLst>
+                              <p:par>
+                                <p:cTn id="5" presetID="1" presetClass="entr" presetSubtype="0" fill="hold" nodeType="clickEffect">
+                                  <p:stCondLst>
+                                    <p:cond delay="0"/>
+                                  </p:stCondLst>
+                                  <p:childTnLst>
+                                    <p:set>
+                                      <p:cBhvr>
+                                        <p:cTn id="6" dur="1" fill="hold">
+                                          <p:stCondLst>
+                                            <p:cond delay="0"/>
+                                          </p:stCondLst>
+                                        </p:cTn>
+                                        <p:tgtEl>
+                                          <p:spTgt spid="2054"/>
+                                        </p:tgtEl>
+                                        <p:attrNameLst>
+                                          <p:attrName>style.visibility</p:attrName>
+                                        </p:attrNameLst>
+                                      </p:cBhvr>
+                                      <p:to>
+                                        <p:strVal val="visible"/>
+                                      </p:to>
+                                    </p:set>
+                                  </p:childTnLst>
+                                </p:cTn>
+                              </p:par>
+                            </p:childTnLst>
+                          </p:cTn>
+                        </p:par>
+                      </p:childTnLst>
+                    </p:cTn>
+                  </p:par>
+                  <p:par>
+                    <p:cTn id="7" fill="hold">
+                      <p:stCondLst>
+                        <p:cond delay="indefinite"/>
+                      </p:stCondLst>
+                      <p:childTnLst>
+                        <p:par>
+                          <p:cTn id="8" fill="hold">
+                            <p:stCondLst>
+                              <p:cond delay="0"/>
+                            </p:stCondLst>
+                            <p:childTnLst>
+                              <p:par>
+                                <p:cTn id="9" presetID="1" presetClass="entr" presetSubtype="0" fill="hold" nodeType="clickEffect">
+                                  <p:stCondLst>
+                                    <p:cond delay="0"/>
+                                  </p:stCondLst>
+                                  <p:childTnLst>
+                                    <p:set>
+                                      <p:cBhvr>
+                                        <p:cTn id="10" dur="1" fill="hold">
+                                          <p:stCondLst>
+                                            <p:cond delay="0"/>
+                                          </p:stCondLst>
+                                        </p:cTn>
+                                        <p:tgtEl>
+                                          <p:spTgt spid="14">
+                                            <p:txEl>
+                                              <p:pRg st="0" end="0"/>
+                                            </p:txEl>
+                                          </p:spTgt>
+                                        </p:tgtEl>
+                                        <p:attrNameLst>
+                                          <p:attrName>style.visibility</p:attrName>
+                                        </p:attrNameLst>
+                                      </p:cBhvr>
+                                      <p:to>
+                                        <p:strVal val="visible"/>
+                                      </p:to>
+                                    </p:set>
+                                  </p:childTnLst>
+                                </p:cTn>
+                              </p:par>
+                            </p:childTnLst>
+                          </p:cTn>
+                        </p:par>
+                      </p:childTnLst>
+                    </p:cTn>
+                  </p:par>
+                  <p:par>
+                    <p:cTn id="11" fill="hold">
+                      <p:stCondLst>
+                        <p:cond delay="indefinite"/>
+                      </p:stCondLst>
+                      <p:childTnLst>
+                        <p:par>
+                          <p:cTn id="12" fill="hold">
+                            <p:stCondLst>
+                              <p:cond delay="0"/>
+                            </p:stCondLst>
+                            <p:childTnLst>
+                              <p:par>
+                                <p:cTn id="13" presetID="1" presetClass="entr" presetSubtype="0" fill="hold" nodeType="clickEffect">
+                                  <p:stCondLst>
+                                    <p:cond delay="0"/>
+                                  </p:stCondLst>
+                                  <p:childTnLst>
+                                    <p:set>
+                                      <p:cBhvr>
+                                        <p:cTn id="14" dur="1" fill="hold">
+                                          <p:stCondLst>
+                                            <p:cond delay="0"/>
+                                          </p:stCondLst>
+                                        </p:cTn>
+                                        <p:tgtEl>
+                                          <p:spTgt spid="14">
+                                            <p:txEl>
+                                              <p:pRg st="1" end="1"/>
+                                            </p:txEl>
+                                          </p:spTgt>
+                                        </p:tgtEl>
+                                        <p:attrNameLst>
+                                          <p:attrName>style.visibility</p:attrName>
+                                        </p:attrNameLst>
+                                      </p:cBhvr>
+                                      <p:to>
+                                        <p:strVal val="visible"/>
+                                      </p:to>
+                                    </p:set>
+                                  </p:childTnLst>
+                                </p:cTn>
+                              </p:par>
+                            </p:childTnLst>
+                          </p:cTn>
+                        </p:par>
+                      </p:childTnLst>
+                    </p:cTn>
+                  </p:par>
+                  <p:par>
+                    <p:cTn id="15" fill="hold">
+                      <p:stCondLst>
+                        <p:cond delay="indefinite"/>
+                      </p:stCondLst>
+                      <p:childTnLst>
+                        <p:par>
+                          <p:cTn id="16" fill="hold">
+                            <p:stCondLst>
+                              <p:cond delay="0"/>
+                            </p:stCondLst>
+                            <p:childTnLst>
+                              <p:par>
+                                <p:cTn id="17" presetID="1" presetClass="entr" presetSubtype="0" fill="hold" nodeType="clickEffect">
+                                  <p:stCondLst>
+                                    <p:cond delay="0"/>
+                                  </p:stCondLst>
+                                  <p:childTnLst>
+                                    <p:set>
+                                      <p:cBhvr>
+                                        <p:cTn id="18" dur="1" fill="hold">
+                                          <p:stCondLst>
+                                            <p:cond delay="0"/>
+                                          </p:stCondLst>
+                                        </p:cTn>
+                                        <p:tgtEl>
+                                          <p:spTgt spid="14">
+                                            <p:txEl>
+                                              <p:pRg st="2" end="2"/>
+                                            </p:txEl>
+                                          </p:spTgt>
+                                        </p:tgtEl>
+                                        <p:attrNameLst>
+                                          <p:attrName>style.visibility</p:attrName>
+                                        </p:attrNameLst>
+                                      </p:cBhvr>
+                                      <p:to>
+                                        <p:strVal val="visible"/>
+                                      </p:to>
+                                    </p:set>
+                                  </p:childTnLst>
+                                </p:cTn>
+                              </p:par>
+                            </p:childTnLst>
+                          </p:cTn>
+                        </p:par>
+                      </p:childTnLst>
+                    </p:cTn>
+                  </p:par>
+                  <p:par>
+                    <p:cTn id="19" fill="hold">
+                      <p:stCondLst>
+                        <p:cond delay="indefinite"/>
+                      </p:stCondLst>
+                      <p:childTnLst>
+                        <p:par>
+                          <p:cTn id="20" fill="hold">
+                            <p:stCondLst>
+                              <p:cond delay="0"/>
+                            </p:stCondLst>
+                            <p:childTnLst>
+                              <p:par>
+                                <p:cTn id="21" presetID="1" presetClass="entr" presetSubtype="0" fill="hold" nodeType="clickEffect">
+                                  <p:stCondLst>
+                                    <p:cond delay="0"/>
+                                  </p:stCondLst>
+                                  <p:childTnLst>
+                                    <p:set>
+                                      <p:cBhvr>
+                                        <p:cTn id="22" dur="1" fill="hold">
+                                          <p:stCondLst>
+                                            <p:cond delay="0"/>
+                                          </p:stCondLst>
+                                        </p:cTn>
+                                        <p:tgtEl>
+                                          <p:spTgt spid="14">
+                                            <p:txEl>
+                                              <p:pRg st="3" end="3"/>
+                                            </p:txEl>
+                                          </p:spTgt>
+                                        </p:tgtEl>
+                                        <p:attrNameLst>
+                                          <p:attrName>style.visibility</p:attrName>
+                                        </p:attrNameLst>
+                                      </p:cBhvr>
+                                      <p:to>
+                                        <p:strVal val="visible"/>
+                                      </p:to>
+                                    </p:set>
+                                  </p:childTnLst>
+                                </p:cTn>
+                              </p:par>
+                            </p:childTnLst>
+                          </p:cTn>
+                        </p:par>
+                      </p:childTnLst>
+                    </p:cTn>
+                  </p:par>
+                  <p:par>
+                    <p:cTn id="23" fill="hold">
+                      <p:stCondLst>
+                        <p:cond delay="indefinite"/>
+                      </p:stCondLst>
+                      <p:childTnLst>
+                        <p:par>
+                          <p:cTn id="24" fill="hold">
+                            <p:stCondLst>
+                              <p:cond delay="0"/>
+                            </p:stCondLst>
+                            <p:childTnLst>
+                              <p:par>
+                                <p:cTn id="25" presetID="1" presetClass="entr" presetSubtype="0" fill="hold" nodeType="clickEffect">
+                                  <p:stCondLst>
+                                    <p:cond delay="0"/>
+                                  </p:stCondLst>
+                                  <p:childTnLst>
+                                    <p:set>
+                                      <p:cBhvr>
+                                        <p:cTn id="26" dur="1" fill="hold">
+                                          <p:stCondLst>
+                                            <p:cond delay="0"/>
+                                          </p:stCondLst>
+                                        </p:cTn>
+                                        <p:tgtEl>
+                                          <p:spTgt spid="22"/>
+                                        </p:tgtEl>
+                                        <p:attrNameLst>
+                                          <p:attrName>style.visibility</p:attrName>
+                                        </p:attrNameLst>
+                                      </p:cBhvr>
+                                      <p:to>
+                                        <p:strVal val="visible"/>
+                                      </p:to>
+                                    </p:set>
+                                  </p:childTnLst>
+                                </p:cTn>
+                              </p:par>
+                            </p:childTnLst>
+                          </p:cTn>
+                        </p:par>
+                      </p:childTnLst>
+                    </p:cTn>
+                  </p:par>
+                  <p:par>
+                    <p:cTn id="27" fill="hold">
+                      <p:stCondLst>
+                        <p:cond delay="indefinite"/>
+                      </p:stCondLst>
+                      <p:childTnLst>
+                        <p:par>
+                          <p:cTn id="28" fill="hold">
+                            <p:stCondLst>
+                              <p:cond delay="0"/>
+                            </p:stCondLst>
+                            <p:childTnLst>
+                              <p:par>
+                                <p:cTn id="29" presetID="1" presetClass="entr" presetSubtype="0" fill="hold" nodeType="clickEffect">
+                                  <p:stCondLst>
+                                    <p:cond delay="0"/>
+                                  </p:stCondLst>
+                                  <p:childTnLst>
+                                    <p:set>
+                                      <p:cBhvr>
+                                        <p:cTn id="30" dur="1" fill="hold">
+                                          <p:stCondLst>
+                                            <p:cond delay="0"/>
+                                          </p:stCondLst>
+                                        </p:cTn>
+                                        <p:tgtEl>
+                                          <p:spTgt spid="26">
+                                            <p:txEl>
+                                              <p:pRg st="0" end="0"/>
+                                            </p:txEl>
+                                          </p:spTgt>
+                                        </p:tgtEl>
+                                        <p:attrNameLst>
+                                          <p:attrName>style.visibility</p:attrName>
+                                        </p:attrNameLst>
+                                      </p:cBhvr>
+                                      <p:to>
+                                        <p:strVal val="visible"/>
+                                      </p:to>
+                                    </p:set>
+                                  </p:childTnLst>
+                                </p:cTn>
+                              </p:par>
+                            </p:childTnLst>
+                          </p:cTn>
+                        </p:par>
+                      </p:childTnLst>
+                    </p:cTn>
+                  </p:par>
+                  <p:par>
+                    <p:cTn id="31" fill="hold">
+                      <p:stCondLst>
+                        <p:cond delay="indefinite"/>
+                      </p:stCondLst>
+                      <p:childTnLst>
+                        <p:par>
+                          <p:cTn id="32" fill="hold">
+                            <p:stCondLst>
+                              <p:cond delay="0"/>
+                            </p:stCondLst>
+                            <p:childTnLst>
+                              <p:par>
+                                <p:cTn id="33" presetID="1" presetClass="entr" presetSubtype="0" fill="hold" nodeType="clickEffect">
+                                  <p:stCondLst>
+                                    <p:cond delay="0"/>
+                                  </p:stCondLst>
+                                  <p:childTnLst>
+                                    <p:set>
+                                      <p:cBhvr>
+                                        <p:cTn id="34" dur="1" fill="hold">
+                                          <p:stCondLst>
+                                            <p:cond delay="0"/>
+                                          </p:stCondLst>
+                                        </p:cTn>
+                                        <p:tgtEl>
+                                          <p:spTgt spid="26">
+                                            <p:txEl>
+                                              <p:pRg st="1" end="1"/>
+                                            </p:txEl>
+                                          </p:spTgt>
+                                        </p:tgtEl>
+                                        <p:attrNameLst>
+                                          <p:attrName>style.visibility</p:attrName>
+                                        </p:attrNameLst>
+                                      </p:cBhvr>
+                                      <p:to>
+                                        <p:strVal val="visible"/>
+                                      </p:to>
+                                    </p:set>
+                                  </p:childTnLst>
+                                </p:cTn>
+                              </p:par>
+                            </p:childTnLst>
+                          </p:cTn>
+                        </p:par>
+                      </p:childTnLst>
+                    </p:cTn>
+                  </p:par>
+                  <p:par>
+                    <p:cTn id="35" fill="hold">
+                      <p:stCondLst>
+                        <p:cond delay="indefinite"/>
+                      </p:stCondLst>
+                      <p:childTnLst>
+                        <p:par>
+                          <p:cTn id="36" fill="hold">
+                            <p:stCondLst>
+                              <p:cond delay="0"/>
+                            </p:stCondLst>
+                            <p:childTnLst>
+                              <p:par>
+                                <p:cTn id="37" presetID="1" presetClass="entr" presetSubtype="0" fill="hold" nodeType="clickEffect">
+                                  <p:stCondLst>
+                                    <p:cond delay="0"/>
+                                  </p:stCondLst>
+                                  <p:childTnLst>
+                                    <p:set>
+                                      <p:cBhvr>
+                                        <p:cTn id="38" dur="1" fill="hold">
+                                          <p:stCondLst>
+                                            <p:cond delay="0"/>
+                                          </p:stCondLst>
+                                        </p:cTn>
+                                        <p:tgtEl>
+                                          <p:spTgt spid="26">
+                                            <p:txEl>
+                                              <p:pRg st="2" end="2"/>
+                                            </p:txEl>
+                                          </p:spTgt>
+                                        </p:tgtEl>
+                                        <p:attrNameLst>
+                                          <p:attrName>style.visibility</p:attrName>
+                                        </p:attrNameLst>
+                                      </p:cBhvr>
+                                      <p:to>
+                                        <p:strVal val="visible"/>
+                                      </p:to>
+                                    </p:set>
+                                  </p:childTnLst>
+                                </p:cTn>
+                              </p:par>
+                            </p:childTnLst>
+                          </p:cTn>
+                        </p:par>
+                      </p:childTnLst>
+                    </p:cTn>
+                  </p:par>
+                  <p:par>
+                    <p:cTn id="39" fill="hold">
+                      <p:stCondLst>
+                        <p:cond delay="indefinite"/>
+                      </p:stCondLst>
+                      <p:childTnLst>
+                        <p:par>
+                          <p:cTn id="40" fill="hold">
+                            <p:stCondLst>
+                              <p:cond delay="0"/>
+                            </p:stCondLst>
+                            <p:childTnLst>
+                              <p:par>
+                                <p:cTn id="41" presetID="1" presetClass="entr" presetSubtype="0" fill="hold" nodeType="clickEffect">
+                                  <p:stCondLst>
+                                    <p:cond delay="0"/>
+                                  </p:stCondLst>
+                                  <p:childTnLst>
+                                    <p:set>
+                                      <p:cBhvr>
+                                        <p:cTn id="42" dur="1" fill="hold">
+                                          <p:stCondLst>
+                                            <p:cond delay="0"/>
+                                          </p:stCondLst>
+                                        </p:cTn>
+                                        <p:tgtEl>
+                                          <p:spTgt spid="26">
+                                            <p:txEl>
+                                              <p:pRg st="3" end="3"/>
+                                            </p:txEl>
+                                          </p:spTgt>
+                                        </p:tgtEl>
+                                        <p:attrNameLst>
+                                          <p:attrName>style.visibility</p:attrName>
+                                        </p:attrNameLst>
+                                      </p:cBhvr>
+                                      <p:to>
+                                        <p:strVal val="visible"/>
+                                      </p:to>
+                                    </p:set>
+                                  </p:childTnLst>
+                                </p:cTn>
+                              </p:par>
+                            </p:childTnLst>
+                          </p:cTn>
+                        </p:par>
+                      </p:childTnLst>
+                    </p:cTn>
+                  </p:par>
+                </p:childTnLst>
+              </p:cTn>
+              <p:prevCondLst>
+                <p:cond evt="onPrev" delay="0">
+                  <p:tgtEl>
+                    <p:sldTgt/>
+                  </p:tgtEl>
+                </p:cond>
+              </p:prevCondLst>
+              <p:nextCondLst>
+                <p:cond evt="onNext" delay="0">
+                  <p:tgtEl>
+                    <p:sldTgt/>
+                  </p:tgtEl>
+                </p:cond>
+              </p:nextCondLst>
+            </p:seq>
+          </p:childTnLst>
+        </p:cTn>
+      </p:par>
+    </p:tnLst>
+  </p:timing>
 </p:sld>
 </file>
 
@@ -5242,7 +5754,7 @@
         </p:blipFill>
         <p:spPr bwMode="auto">
           <a:xfrm>
-            <a:off x="1381860" y="3417727"/>
+            <a:off x="1024658" y="3451283"/>
             <a:ext cx="4367919" cy="3083741"/>
           </a:xfrm>
           <a:prstGeom prst="rect">

</xml_diff>

<commit_message>
Created Technical report, updated other files
</commit_message>
<xml_diff>
--- a/Non-Technical Summary.pptx
+++ b/Non-Technical Summary.pptx
@@ -6159,11 +6159,14 @@
               <a:buChar char="•"/>
             </a:pPr>
             <a:r>
-              <a:rPr lang="hu-HU" sz="2000" dirty="0">
+              <a:rPr lang="hu-HU" sz="2000">
                 <a:latin typeface="Bahnschrift Light SemiCondensed" panose="020B0502040204020203" pitchFamily="34" charset="0"/>
               </a:rPr>
-              <a:t>AI model with 50 parameters</a:t>
-            </a:r>
+              <a:t>Pre-Trained AI model support</a:t>
+            </a:r>
+            <a:endParaRPr lang="hu-HU" sz="2000" dirty="0">
+              <a:latin typeface="Bahnschrift Light SemiCondensed" panose="020B0502040204020203" pitchFamily="34" charset="0"/>
+            </a:endParaRPr>
           </a:p>
           <a:p>
             <a:pPr marL="571500" indent="-571500">

</xml_diff>